<commit_message>
Deploy website Wed Feb 28 10:54:14 PST 2024
</commit_message>
<xml_diff>
--- a/assets/slides/sp24/05-HOFs.pptx
+++ b/assets/slides/sp24/05-HOFs.pptx
@@ -1312,37 +1312,37 @@
           <a:lstStyle>
             <a:lvl1pPr>
               <a:defRPr sz="2800" b="0" i="0" baseline="0">
-                <a:latin typeface="Open Sans" panose="020B0606030504020204" pitchFamily="34" charset="0"/>
-                <a:ea typeface="Open Sans" panose="020B0606030504020204" pitchFamily="34" charset="0"/>
-                <a:cs typeface="Open Sans" panose="020B0606030504020204" pitchFamily="34" charset="0"/>
+                <a:latin typeface="Open Sans Light" panose="020B0606030504020204" pitchFamily="34" charset="0"/>
+                <a:ea typeface="Open Sans Light" panose="020B0606030504020204" pitchFamily="34" charset="0"/>
+                <a:cs typeface="Open Sans Light" panose="020B0606030504020204" pitchFamily="34" charset="0"/>
               </a:defRPr>
             </a:lvl1pPr>
             <a:lvl2pPr>
               <a:defRPr sz="2800" b="0" i="0" baseline="0">
-                <a:latin typeface="Open Sans" panose="020B0606030504020204" pitchFamily="34" charset="0"/>
-                <a:ea typeface="Open Sans" panose="020B0606030504020204" pitchFamily="34" charset="0"/>
-                <a:cs typeface="Open Sans" panose="020B0606030504020204" pitchFamily="34" charset="0"/>
+                <a:latin typeface="Open Sans Light" panose="020B0606030504020204" pitchFamily="34" charset="0"/>
+                <a:ea typeface="Open Sans Light" panose="020B0606030504020204" pitchFamily="34" charset="0"/>
+                <a:cs typeface="Open Sans Light" panose="020B0606030504020204" pitchFamily="34" charset="0"/>
               </a:defRPr>
             </a:lvl2pPr>
             <a:lvl3pPr>
               <a:defRPr sz="2400" b="0" i="0" baseline="0">
-                <a:latin typeface="Open Sans" panose="020B0606030504020204" pitchFamily="34" charset="0"/>
-                <a:ea typeface="Open Sans" panose="020B0606030504020204" pitchFamily="34" charset="0"/>
-                <a:cs typeface="Open Sans" panose="020B0606030504020204" pitchFamily="34" charset="0"/>
+                <a:latin typeface="Open Sans Light" panose="020B0606030504020204" pitchFamily="34" charset="0"/>
+                <a:ea typeface="Open Sans Light" panose="020B0606030504020204" pitchFamily="34" charset="0"/>
+                <a:cs typeface="Open Sans Light" panose="020B0606030504020204" pitchFamily="34" charset="0"/>
               </a:defRPr>
             </a:lvl3pPr>
             <a:lvl4pPr>
               <a:defRPr sz="2400" b="0" i="0" baseline="0">
-                <a:latin typeface="Open Sans" panose="020B0606030504020204" pitchFamily="34" charset="0"/>
-                <a:ea typeface="Open Sans" panose="020B0606030504020204" pitchFamily="34" charset="0"/>
-                <a:cs typeface="Open Sans" panose="020B0606030504020204" pitchFamily="34" charset="0"/>
+                <a:latin typeface="Open Sans Light" panose="020B0606030504020204" pitchFamily="34" charset="0"/>
+                <a:ea typeface="Open Sans Light" panose="020B0606030504020204" pitchFamily="34" charset="0"/>
+                <a:cs typeface="Open Sans Light" panose="020B0606030504020204" pitchFamily="34" charset="0"/>
               </a:defRPr>
             </a:lvl4pPr>
             <a:lvl5pPr>
               <a:defRPr sz="2000" b="0" i="0" baseline="0">
-                <a:latin typeface="Open Sans" panose="020B0606030504020204" pitchFamily="34" charset="0"/>
-                <a:ea typeface="Open Sans" panose="020B0606030504020204" pitchFamily="34" charset="0"/>
-                <a:cs typeface="Open Sans" panose="020B0606030504020204" pitchFamily="34" charset="0"/>
+                <a:latin typeface="Open Sans Light" panose="020B0606030504020204" pitchFamily="34" charset="0"/>
+                <a:ea typeface="Open Sans Light" panose="020B0606030504020204" pitchFamily="34" charset="0"/>
+                <a:cs typeface="Open Sans Light" panose="020B0606030504020204" pitchFamily="34" charset="0"/>
               </a:defRPr>
             </a:lvl5pPr>
           </a:lstStyle>
@@ -2568,7 +2568,7 @@
           <a:lstStyle>
             <a:lvl1pPr>
               <a:defRPr b="0" i="0">
-                <a:latin typeface="Open Sans"/>
+                <a:latin typeface="Open Sans Light"/>
               </a:defRPr>
             </a:lvl1pPr>
           </a:lstStyle>
@@ -2625,7 +2625,7 @@
           <a:lstStyle>
             <a:lvl1pPr>
               <a:defRPr b="0" i="0">
-                <a:latin typeface="Open Sans"/>
+                <a:latin typeface="Open Sans Light"/>
               </a:defRPr>
             </a:lvl1pPr>
           </a:lstStyle>
@@ -2963,37 +2963,37 @@
           <a:lstStyle>
             <a:lvl1pPr>
               <a:defRPr sz="2200" b="0" i="0" baseline="0">
-                <a:latin typeface="Open Sans" panose="020B0606030504020204" pitchFamily="34" charset="0"/>
-                <a:ea typeface="Open Sans" panose="020B0606030504020204" pitchFamily="34" charset="0"/>
-                <a:cs typeface="Open Sans" panose="020B0606030504020204" pitchFamily="34" charset="0"/>
+                <a:latin typeface="Open Sans Light" panose="020B0606030504020204" pitchFamily="34" charset="0"/>
+                <a:ea typeface="Open Sans Light" panose="020B0606030504020204" pitchFamily="34" charset="0"/>
+                <a:cs typeface="Open Sans Light" panose="020B0606030504020204" pitchFamily="34" charset="0"/>
               </a:defRPr>
             </a:lvl1pPr>
             <a:lvl2pPr>
               <a:defRPr sz="2200" b="0" i="0" baseline="0">
-                <a:latin typeface="Open Sans" panose="020B0606030504020204" pitchFamily="34" charset="0"/>
-                <a:ea typeface="Open Sans" panose="020B0606030504020204" pitchFamily="34" charset="0"/>
-                <a:cs typeface="Open Sans" panose="020B0606030504020204" pitchFamily="34" charset="0"/>
+                <a:latin typeface="Open Sans Light" panose="020B0606030504020204" pitchFamily="34" charset="0"/>
+                <a:ea typeface="Open Sans Light" panose="020B0606030504020204" pitchFamily="34" charset="0"/>
+                <a:cs typeface="Open Sans Light" panose="020B0606030504020204" pitchFamily="34" charset="0"/>
               </a:defRPr>
             </a:lvl2pPr>
             <a:lvl3pPr>
               <a:defRPr sz="2000" b="0" i="0" baseline="0">
-                <a:latin typeface="Open Sans" panose="020B0606030504020204" pitchFamily="34" charset="0"/>
-                <a:ea typeface="Open Sans" panose="020B0606030504020204" pitchFamily="34" charset="0"/>
-                <a:cs typeface="Open Sans" panose="020B0606030504020204" pitchFamily="34" charset="0"/>
+                <a:latin typeface="Open Sans Light" panose="020B0606030504020204" pitchFamily="34" charset="0"/>
+                <a:ea typeface="Open Sans Light" panose="020B0606030504020204" pitchFamily="34" charset="0"/>
+                <a:cs typeface="Open Sans Light" panose="020B0606030504020204" pitchFamily="34" charset="0"/>
               </a:defRPr>
             </a:lvl3pPr>
             <a:lvl4pPr>
               <a:defRPr sz="2000" b="0" i="0" baseline="0">
-                <a:latin typeface="Open Sans" panose="020B0606030504020204" pitchFamily="34" charset="0"/>
-                <a:ea typeface="Open Sans" panose="020B0606030504020204" pitchFamily="34" charset="0"/>
-                <a:cs typeface="Open Sans" panose="020B0606030504020204" pitchFamily="34" charset="0"/>
+                <a:latin typeface="Open Sans Light" panose="020B0606030504020204" pitchFamily="34" charset="0"/>
+                <a:ea typeface="Open Sans Light" panose="020B0606030504020204" pitchFamily="34" charset="0"/>
+                <a:cs typeface="Open Sans Light" panose="020B0606030504020204" pitchFamily="34" charset="0"/>
               </a:defRPr>
             </a:lvl4pPr>
             <a:lvl5pPr>
               <a:defRPr sz="1800" b="0" i="0" baseline="0">
-                <a:latin typeface="Open Sans" panose="020B0606030504020204" pitchFamily="34" charset="0"/>
-                <a:ea typeface="Open Sans" panose="020B0606030504020204" pitchFamily="34" charset="0"/>
-                <a:cs typeface="Open Sans" panose="020B0606030504020204" pitchFamily="34" charset="0"/>
+                <a:latin typeface="Open Sans Light" panose="020B0606030504020204" pitchFamily="34" charset="0"/>
+                <a:ea typeface="Open Sans Light" panose="020B0606030504020204" pitchFamily="34" charset="0"/>
+                <a:cs typeface="Open Sans Light" panose="020B0606030504020204" pitchFamily="34" charset="0"/>
               </a:defRPr>
             </a:lvl5pPr>
           </a:lstStyle>
@@ -4002,7 +4002,7 @@
           </a:ln>
           <a:extLst>
             <a:ext uri="{909E8E84-426E-40dd-AFC4-6F175D3DCCD1}">
-              <a14:hiddenFill xmlns:a14="http://schemas.microsoft.com/office/drawing/2010/main" xmlns="">
+              <a14:hiddenFill xmlns="" xmlns:a14="http://schemas.microsoft.com/office/drawing/2010/main">
                 <a:noFill/>
               </a14:hiddenFill>
             </a:ext>
@@ -4013,9 +4013,9 @@
           <a:lstStyle/>
           <a:p>
             <a:endParaRPr lang="en-US" sz="760" b="0" i="0">
-              <a:latin typeface="Open Sans" panose="020B0606030504020204" pitchFamily="34" charset="0"/>
-              <a:ea typeface="Open Sans" panose="020B0606030504020204" pitchFamily="34" charset="0"/>
-              <a:cs typeface="Open Sans" panose="020B0606030504020204" pitchFamily="34" charset="0"/>
+              <a:latin typeface="Open Sans Light" panose="020B0606030504020204" pitchFamily="34" charset="0"/>
+              <a:ea typeface="Open Sans Light" panose="020B0606030504020204" pitchFamily="34" charset="0"/>
+              <a:cs typeface="Open Sans Light" panose="020B0606030504020204" pitchFamily="34" charset="0"/>
             </a:endParaRPr>
           </a:p>
         </p:txBody>
@@ -4124,14 +4124,14 @@
           </a:ln>
           <a:extLst>
             <a:ext uri="{909E8E84-426E-40dd-AFC4-6F175D3DCCD1}">
-              <a14:hiddenFill xmlns:a14="http://schemas.microsoft.com/office/drawing/2010/main" xmlns="">
+              <a14:hiddenFill xmlns="" xmlns:a14="http://schemas.microsoft.com/office/drawing/2010/main">
                 <a:solidFill>
                   <a:srgbClr val="FFFFFF"/>
                 </a:solidFill>
               </a14:hiddenFill>
             </a:ext>
             <a:ext uri="{91240B29-F687-4f45-9708-019B960494DF}">
-              <a14:hiddenLine xmlns:a14="http://schemas.microsoft.com/office/drawing/2010/main" xmlns="" w="9525">
+              <a14:hiddenLine xmlns="" xmlns:a14="http://schemas.microsoft.com/office/drawing/2010/main" w="9525">
                 <a:solidFill>
                   <a:srgbClr val="000000"/>
                 </a:solidFill>
@@ -4141,7 +4141,7 @@
               </a14:hiddenLine>
             </a:ext>
             <a:ext uri="{FAA26D3D-D897-4be2-8F04-BA451C77F1D7}">
-              <ma14:placeholderFlag xmlns:ma14="http://schemas.microsoft.com/office/mac/drawingml/2011/main" xmlns="" val="1"/>
+              <ma14:placeholderFlag xmlns="" xmlns:ma14="http://schemas.microsoft.com/office/mac/drawingml/2011/main" val="1"/>
             </a:ext>
           </a:extLst>
         </p:spPr>
@@ -4358,9 +4358,9 @@
           <a:lstStyle/>
           <a:p>
             <a:endParaRPr lang="en-US" sz="788" b="0" i="0">
-              <a:latin typeface="Open Sans" panose="020B0606030504020204" pitchFamily="34" charset="0"/>
-              <a:ea typeface="Open Sans" panose="020B0606030504020204" pitchFamily="34" charset="0"/>
-              <a:cs typeface="Open Sans" panose="020B0606030504020204" pitchFamily="34" charset="0"/>
+              <a:latin typeface="Open Sans Light" panose="020B0606030504020204" pitchFamily="34" charset="0"/>
+              <a:ea typeface="Open Sans Light" panose="020B0606030504020204" pitchFamily="34" charset="0"/>
+              <a:cs typeface="Open Sans Light" panose="020B0606030504020204" pitchFamily="34" charset="0"/>
             </a:endParaRPr>
           </a:p>
         </p:txBody>
@@ -4699,7 +4699,7 @@
           </a:ln>
           <a:extLst>
             <a:ext uri="{909E8E84-426E-40dd-AFC4-6F175D3DCCD1}">
-              <a14:hiddenFill xmlns:a14="http://schemas.microsoft.com/office/drawing/2010/main" xmlns="">
+              <a14:hiddenFill xmlns="" xmlns:a14="http://schemas.microsoft.com/office/drawing/2010/main">
                 <a:noFill/>
               </a14:hiddenFill>
             </a:ext>
@@ -4710,9 +4710,9 @@
           <a:lstStyle/>
           <a:p>
             <a:endParaRPr lang="en-US" sz="760" b="0" i="0" dirty="0">
-              <a:latin typeface="Open Sans" panose="020B0606030504020204" pitchFamily="34" charset="0"/>
-              <a:ea typeface="Open Sans" panose="020B0606030504020204" pitchFamily="34" charset="0"/>
-              <a:cs typeface="Open Sans" panose="020B0606030504020204" pitchFamily="34" charset="0"/>
+              <a:latin typeface="Open Sans Light" panose="020B0606030504020204" pitchFamily="34" charset="0"/>
+              <a:ea typeface="Open Sans Light" panose="020B0606030504020204" pitchFamily="34" charset="0"/>
+              <a:cs typeface="Open Sans Light" panose="020B0606030504020204" pitchFamily="34" charset="0"/>
             </a:endParaRPr>
           </a:p>
         </p:txBody>
@@ -4744,14 +4744,14 @@
           </a:ln>
           <a:extLst>
             <a:ext uri="{909E8E84-426E-40dd-AFC4-6F175D3DCCD1}">
-              <a14:hiddenFill xmlns:a14="http://schemas.microsoft.com/office/drawing/2010/main" xmlns="">
+              <a14:hiddenFill xmlns="" xmlns:a14="http://schemas.microsoft.com/office/drawing/2010/main">
                 <a:solidFill>
                   <a:srgbClr val="FFFFFF"/>
                 </a:solidFill>
               </a14:hiddenFill>
             </a:ext>
             <a:ext uri="{91240B29-F687-4f45-9708-019B960494DF}">
-              <a14:hiddenLine xmlns:a14="http://schemas.microsoft.com/office/drawing/2010/main" xmlns="" w="9525">
+              <a14:hiddenLine xmlns="" xmlns:a14="http://schemas.microsoft.com/office/drawing/2010/main" w="9525">
                 <a:solidFill>
                   <a:srgbClr val="000000"/>
                 </a:solidFill>
@@ -4859,14 +4859,14 @@
           </a:ln>
           <a:extLst>
             <a:ext uri="{909E8E84-426E-40dd-AFC4-6F175D3DCCD1}">
-              <a14:hiddenFill xmlns:a14="http://schemas.microsoft.com/office/drawing/2010/main" xmlns="">
+              <a14:hiddenFill xmlns="" xmlns:a14="http://schemas.microsoft.com/office/drawing/2010/main">
                 <a:solidFill>
                   <a:srgbClr val="FFFFFF"/>
                 </a:solidFill>
               </a14:hiddenFill>
             </a:ext>
             <a:ext uri="{91240B29-F687-4f45-9708-019B960494DF}">
-              <a14:hiddenLine xmlns:a14="http://schemas.microsoft.com/office/drawing/2010/main" xmlns="" w="9525">
+              <a14:hiddenLine xmlns="" xmlns:a14="http://schemas.microsoft.com/office/drawing/2010/main" w="9525">
                 <a:solidFill>
                   <a:srgbClr val="000000"/>
                 </a:solidFill>
@@ -4876,7 +4876,7 @@
               </a14:hiddenLine>
             </a:ext>
             <a:ext uri="{FAA26D3D-D897-4be2-8F04-BA451C77F1D7}">
-              <ma14:placeholderFlag xmlns:ma14="http://schemas.microsoft.com/office/mac/drawingml/2011/main" xmlns="" val="1"/>
+              <ma14:placeholderFlag xmlns="" xmlns:ma14="http://schemas.microsoft.com/office/mac/drawingml/2011/main" val="1"/>
             </a:ext>
           </a:extLst>
         </p:spPr>
@@ -5097,9 +5097,9 @@
                 <a:solidFill>
                   <a:schemeClr val="bg2"/>
                 </a:solidFill>
-                <a:latin typeface="Open Sans"/>
-                <a:ea typeface="Open Sans" panose="020B0606030504020204" pitchFamily="34" charset="0"/>
-                <a:cs typeface="Open Sans" panose="020B0606030504020204" pitchFamily="34" charset="0"/>
+                <a:latin typeface="Open Sans Light"/>
+                <a:ea typeface="Open Sans Light" panose="020B0606030504020204" pitchFamily="34" charset="0"/>
+                <a:cs typeface="Open Sans Light" panose="020B0606030504020204" pitchFamily="34" charset="0"/>
               </a:rPr>
               <a:t>UC Berkeley EECS</a:t>
             </a:r>
@@ -5108,9 +5108,9 @@
                 <a:solidFill>
                   <a:schemeClr val="bg2"/>
                 </a:solidFill>
-                <a:latin typeface="Open Sans"/>
-                <a:ea typeface="Open Sans" panose="020B0606030504020204" pitchFamily="34" charset="0"/>
-                <a:cs typeface="Open Sans" panose="020B0606030504020204" pitchFamily="34" charset="0"/>
+                <a:latin typeface="Open Sans Light"/>
+                <a:ea typeface="Open Sans Light" panose="020B0606030504020204" pitchFamily="34" charset="0"/>
+                <a:cs typeface="Open Sans Light" panose="020B0606030504020204" pitchFamily="34" charset="0"/>
               </a:rPr>
             </a:br>
             <a:r>
@@ -5118,9 +5118,9 @@
                 <a:solidFill>
                   <a:schemeClr val="bg2"/>
                 </a:solidFill>
-                <a:latin typeface="Open Sans"/>
-                <a:ea typeface="Open Sans" panose="020B0606030504020204" pitchFamily="34" charset="0"/>
-                <a:cs typeface="Open Sans" panose="020B0606030504020204" pitchFamily="34" charset="0"/>
+                <a:latin typeface="Open Sans Light"/>
+                <a:ea typeface="Open Sans Light" panose="020B0606030504020204" pitchFamily="34" charset="0"/>
+                <a:cs typeface="Open Sans Light" panose="020B0606030504020204" pitchFamily="34" charset="0"/>
               </a:rPr>
               <a:t>Lecturer</a:t>
             </a:r>
@@ -5134,9 +5134,9 @@
                 <a:solidFill>
                   <a:schemeClr val="bg2"/>
                 </a:solidFill>
-                <a:latin typeface="Open Sans"/>
-                <a:ea typeface="Open Sans" panose="020B0606030504020204" pitchFamily="34" charset="0"/>
-                <a:cs typeface="Open Sans" panose="020B0606030504020204" pitchFamily="34" charset="0"/>
+                <a:latin typeface="Open Sans Light"/>
+                <a:ea typeface="Open Sans Light" panose="020B0606030504020204" pitchFamily="34" charset="0"/>
+                <a:cs typeface="Open Sans Light" panose="020B0606030504020204" pitchFamily="34" charset="0"/>
               </a:rPr>
               <a:t>Michael Ball</a:t>
             </a:r>
@@ -5224,14 +5224,14 @@
           </a:ln>
           <a:extLst>
             <a:ext uri="{909E8E84-426E-40dd-AFC4-6F175D3DCCD1}">
-              <a14:hiddenFill xmlns:a14="http://schemas.microsoft.com/office/drawing/2010/main" xmlns="">
+              <a14:hiddenFill xmlns="" xmlns:a14="http://schemas.microsoft.com/office/drawing/2010/main">
                 <a:solidFill>
                   <a:srgbClr val="FFFFFF"/>
                 </a:solidFill>
               </a14:hiddenFill>
             </a:ext>
             <a:ext uri="{91240B29-F687-4f45-9708-019B960494DF}">
-              <a14:hiddenLine xmlns:a14="http://schemas.microsoft.com/office/drawing/2010/main" xmlns="" w="9525">
+              <a14:hiddenLine xmlns="" xmlns:a14="http://schemas.microsoft.com/office/drawing/2010/main" w="9525">
                 <a:solidFill>
                   <a:srgbClr val="000000"/>
                 </a:solidFill>
@@ -5241,7 +5241,7 @@
               </a14:hiddenLine>
             </a:ext>
             <a:ext uri="{FAA26D3D-D897-4be2-8F04-BA451C77F1D7}">
-              <ma14:placeholderFlag xmlns:ma14="http://schemas.microsoft.com/office/mac/drawingml/2011/main" xmlns="" val="1"/>
+              <ma14:placeholderFlag xmlns="" xmlns:ma14="http://schemas.microsoft.com/office/mac/drawingml/2011/main" val="1"/>
             </a:ext>
           </a:extLst>
         </p:spPr>
@@ -5458,9 +5458,9 @@
           <a:lstStyle/>
           <a:p>
             <a:endParaRPr lang="en-US" sz="788" b="0" i="0" dirty="0">
-              <a:latin typeface="Open Sans" panose="020B0606030504020204" pitchFamily="34" charset="0"/>
-              <a:ea typeface="Open Sans" panose="020B0606030504020204" pitchFamily="34" charset="0"/>
-              <a:cs typeface="Open Sans" panose="020B0606030504020204" pitchFamily="34" charset="0"/>
+              <a:latin typeface="Open Sans Light" panose="020B0606030504020204" pitchFamily="34" charset="0"/>
+              <a:ea typeface="Open Sans Light" panose="020B0606030504020204" pitchFamily="34" charset="0"/>
+              <a:cs typeface="Open Sans Light" panose="020B0606030504020204" pitchFamily="34" charset="0"/>
             </a:endParaRPr>
           </a:p>
         </p:txBody>
@@ -5494,9 +5494,9 @@
           <a:lstStyle/>
           <a:p>
             <a:endParaRPr lang="en-US" b="0" i="0" dirty="0">
-              <a:latin typeface="Open Sans" panose="020B0606030504020204" pitchFamily="34" charset="0"/>
-              <a:ea typeface="Open Sans" panose="020B0606030504020204" pitchFamily="34" charset="0"/>
-              <a:cs typeface="Open Sans" panose="020B0606030504020204" pitchFamily="34" charset="0"/>
+              <a:latin typeface="Open Sans Light" panose="020B0606030504020204" pitchFamily="34" charset="0"/>
+              <a:ea typeface="Open Sans Light" panose="020B0606030504020204" pitchFamily="34" charset="0"/>
+              <a:cs typeface="Open Sans Light" panose="020B0606030504020204" pitchFamily="34" charset="0"/>
             </a:endParaRPr>
           </a:p>
         </p:txBody>
@@ -6302,7 +6302,7 @@
           </a:ln>
           <a:extLst>
             <a:ext uri="{909E8E84-426E-40dd-AFC4-6F175D3DCCD1}">
-              <a14:hiddenFill xmlns="" xmlns:a14="http://schemas.microsoft.com/office/drawing/2010/main">
+              <a14:hiddenFill xmlns:a14="http://schemas.microsoft.com/office/drawing/2010/main" xmlns="">
                 <a:noFill/>
               </a14:hiddenFill>
             </a:ext>
@@ -6313,9 +6313,9 @@
           <a:lstStyle/>
           <a:p>
             <a:endParaRPr lang="en-US" sz="760" b="0" i="0">
-              <a:latin typeface="Open Sans" panose="020B0606030504020204" pitchFamily="34" charset="0"/>
-              <a:ea typeface="Open Sans" panose="020B0606030504020204" pitchFamily="34" charset="0"/>
-              <a:cs typeface="Open Sans" panose="020B0606030504020204" pitchFamily="34" charset="0"/>
+              <a:latin typeface="Open Sans Light" panose="020B0606030504020204" pitchFamily="34" charset="0"/>
+              <a:ea typeface="Open Sans Light" panose="020B0606030504020204" pitchFamily="34" charset="0"/>
+              <a:cs typeface="Open Sans Light" panose="020B0606030504020204" pitchFamily="34" charset="0"/>
             </a:endParaRPr>
           </a:p>
         </p:txBody>
@@ -6427,14 +6427,14 @@
           </a:ln>
           <a:extLst>
             <a:ext uri="{909E8E84-426E-40dd-AFC4-6F175D3DCCD1}">
-              <a14:hiddenFill xmlns="" xmlns:a14="http://schemas.microsoft.com/office/drawing/2010/main">
+              <a14:hiddenFill xmlns:a14="http://schemas.microsoft.com/office/drawing/2010/main" xmlns="">
                 <a:solidFill>
                   <a:srgbClr val="FFFFFF"/>
                 </a:solidFill>
               </a14:hiddenFill>
             </a:ext>
             <a:ext uri="{91240B29-F687-4f45-9708-019B960494DF}">
-              <a14:hiddenLine xmlns="" xmlns:a14="http://schemas.microsoft.com/office/drawing/2010/main" w="9525">
+              <a14:hiddenLine xmlns:a14="http://schemas.microsoft.com/office/drawing/2010/main" xmlns="" w="9525">
                 <a:solidFill>
                   <a:srgbClr val="000000"/>
                 </a:solidFill>
@@ -6444,7 +6444,7 @@
               </a14:hiddenLine>
             </a:ext>
             <a:ext uri="{FAA26D3D-D897-4be2-8F04-BA451C77F1D7}">
-              <ma14:placeholderFlag xmlns="" xmlns:ma14="http://schemas.microsoft.com/office/mac/drawingml/2011/main" val="1"/>
+              <ma14:placeholderFlag xmlns:ma14="http://schemas.microsoft.com/office/mac/drawingml/2011/main" xmlns="" val="1"/>
             </a:ext>
           </a:extLst>
         </p:spPr>
@@ -6661,9 +6661,9 @@
           <a:lstStyle/>
           <a:p>
             <a:endParaRPr lang="en-US" sz="788" b="0" i="0">
-              <a:latin typeface="Open Sans" panose="020B0606030504020204" pitchFamily="34" charset="0"/>
-              <a:ea typeface="Open Sans" panose="020B0606030504020204" pitchFamily="34" charset="0"/>
-              <a:cs typeface="Open Sans" panose="020B0606030504020204" pitchFamily="34" charset="0"/>
+              <a:latin typeface="Open Sans Light" panose="020B0606030504020204" pitchFamily="34" charset="0"/>
+              <a:ea typeface="Open Sans Light" panose="020B0606030504020204" pitchFamily="34" charset="0"/>
+              <a:cs typeface="Open Sans Light" panose="020B0606030504020204" pitchFamily="34" charset="0"/>
             </a:endParaRPr>
           </a:p>
         </p:txBody>
@@ -7405,37 +7405,37 @@
           <a:lstStyle>
             <a:lvl1pPr>
               <a:defRPr sz="2200" b="0" i="0" baseline="0">
-                <a:latin typeface="Open Sans" panose="020B0606030504020204" pitchFamily="34" charset="0"/>
-                <a:ea typeface="Open Sans" panose="020B0606030504020204" pitchFamily="34" charset="0"/>
-                <a:cs typeface="Open Sans" panose="020B0606030504020204" pitchFamily="34" charset="0"/>
+                <a:latin typeface="Open Sans Light" panose="020B0606030504020204" pitchFamily="34" charset="0"/>
+                <a:ea typeface="Open Sans Light" panose="020B0606030504020204" pitchFamily="34" charset="0"/>
+                <a:cs typeface="Open Sans Light" panose="020B0606030504020204" pitchFamily="34" charset="0"/>
               </a:defRPr>
             </a:lvl1pPr>
             <a:lvl2pPr>
               <a:defRPr sz="2200" b="0" i="0" baseline="0">
-                <a:latin typeface="Open Sans" panose="020B0606030504020204" pitchFamily="34" charset="0"/>
-                <a:ea typeface="Open Sans" panose="020B0606030504020204" pitchFamily="34" charset="0"/>
-                <a:cs typeface="Open Sans" panose="020B0606030504020204" pitchFamily="34" charset="0"/>
+                <a:latin typeface="Open Sans Light" panose="020B0606030504020204" pitchFamily="34" charset="0"/>
+                <a:ea typeface="Open Sans Light" panose="020B0606030504020204" pitchFamily="34" charset="0"/>
+                <a:cs typeface="Open Sans Light" panose="020B0606030504020204" pitchFamily="34" charset="0"/>
               </a:defRPr>
             </a:lvl2pPr>
             <a:lvl3pPr>
               <a:defRPr sz="2000" b="0" i="0" baseline="0">
-                <a:latin typeface="Open Sans" panose="020B0606030504020204" pitchFamily="34" charset="0"/>
-                <a:ea typeface="Open Sans" panose="020B0606030504020204" pitchFamily="34" charset="0"/>
-                <a:cs typeface="Open Sans" panose="020B0606030504020204" pitchFamily="34" charset="0"/>
+                <a:latin typeface="Open Sans Light" panose="020B0606030504020204" pitchFamily="34" charset="0"/>
+                <a:ea typeface="Open Sans Light" panose="020B0606030504020204" pitchFamily="34" charset="0"/>
+                <a:cs typeface="Open Sans Light" panose="020B0606030504020204" pitchFamily="34" charset="0"/>
               </a:defRPr>
             </a:lvl3pPr>
             <a:lvl4pPr>
               <a:defRPr sz="2000" b="0" i="0" baseline="0">
-                <a:latin typeface="Open Sans" panose="020B0606030504020204" pitchFamily="34" charset="0"/>
-                <a:ea typeface="Open Sans" panose="020B0606030504020204" pitchFamily="34" charset="0"/>
-                <a:cs typeface="Open Sans" panose="020B0606030504020204" pitchFamily="34" charset="0"/>
+                <a:latin typeface="Open Sans Light" panose="020B0606030504020204" pitchFamily="34" charset="0"/>
+                <a:ea typeface="Open Sans Light" panose="020B0606030504020204" pitchFamily="34" charset="0"/>
+                <a:cs typeface="Open Sans Light" panose="020B0606030504020204" pitchFamily="34" charset="0"/>
               </a:defRPr>
             </a:lvl4pPr>
             <a:lvl5pPr>
               <a:defRPr sz="1800" b="0" i="0" baseline="0">
-                <a:latin typeface="Open Sans" panose="020B0606030504020204" pitchFamily="34" charset="0"/>
-                <a:ea typeface="Open Sans" panose="020B0606030504020204" pitchFamily="34" charset="0"/>
-                <a:cs typeface="Open Sans" panose="020B0606030504020204" pitchFamily="34" charset="0"/>
+                <a:latin typeface="Open Sans Light" panose="020B0606030504020204" pitchFamily="34" charset="0"/>
+                <a:ea typeface="Open Sans Light" panose="020B0606030504020204" pitchFamily="34" charset="0"/>
+                <a:cs typeface="Open Sans Light" panose="020B0606030504020204" pitchFamily="34" charset="0"/>
               </a:defRPr>
             </a:lvl5pPr>
           </a:lstStyle>
@@ -7675,37 +7675,37 @@
           <a:lstStyle>
             <a:lvl1pPr>
               <a:defRPr sz="2200" b="0" i="0" baseline="0">
-                <a:latin typeface="Open Sans" panose="020B0606030504020204" pitchFamily="34" charset="0"/>
-                <a:ea typeface="Open Sans" panose="020B0606030504020204" pitchFamily="34" charset="0"/>
-                <a:cs typeface="Open Sans" panose="020B0606030504020204" pitchFamily="34" charset="0"/>
+                <a:latin typeface="Open Sans Light" panose="020B0606030504020204" pitchFamily="34" charset="0"/>
+                <a:ea typeface="Open Sans Light" panose="020B0606030504020204" pitchFamily="34" charset="0"/>
+                <a:cs typeface="Open Sans Light" panose="020B0606030504020204" pitchFamily="34" charset="0"/>
               </a:defRPr>
             </a:lvl1pPr>
             <a:lvl2pPr>
               <a:defRPr sz="2200" b="0" i="0" baseline="0">
-                <a:latin typeface="Open Sans" panose="020B0606030504020204" pitchFamily="34" charset="0"/>
-                <a:ea typeface="Open Sans" panose="020B0606030504020204" pitchFamily="34" charset="0"/>
-                <a:cs typeface="Open Sans" panose="020B0606030504020204" pitchFamily="34" charset="0"/>
+                <a:latin typeface="Open Sans Light" panose="020B0606030504020204" pitchFamily="34" charset="0"/>
+                <a:ea typeface="Open Sans Light" panose="020B0606030504020204" pitchFamily="34" charset="0"/>
+                <a:cs typeface="Open Sans Light" panose="020B0606030504020204" pitchFamily="34" charset="0"/>
               </a:defRPr>
             </a:lvl2pPr>
             <a:lvl3pPr>
               <a:defRPr sz="2000" b="0" i="0" baseline="0">
-                <a:latin typeface="Open Sans" panose="020B0606030504020204" pitchFamily="34" charset="0"/>
-                <a:ea typeface="Open Sans" panose="020B0606030504020204" pitchFamily="34" charset="0"/>
-                <a:cs typeface="Open Sans" panose="020B0606030504020204" pitchFamily="34" charset="0"/>
+                <a:latin typeface="Open Sans Light" panose="020B0606030504020204" pitchFamily="34" charset="0"/>
+                <a:ea typeface="Open Sans Light" panose="020B0606030504020204" pitchFamily="34" charset="0"/>
+                <a:cs typeface="Open Sans Light" panose="020B0606030504020204" pitchFamily="34" charset="0"/>
               </a:defRPr>
             </a:lvl3pPr>
             <a:lvl4pPr>
               <a:defRPr sz="2000" b="0" i="0" baseline="0">
-                <a:latin typeface="Open Sans" panose="020B0606030504020204" pitchFamily="34" charset="0"/>
-                <a:ea typeface="Open Sans" panose="020B0606030504020204" pitchFamily="34" charset="0"/>
-                <a:cs typeface="Open Sans" panose="020B0606030504020204" pitchFamily="34" charset="0"/>
+                <a:latin typeface="Open Sans Light" panose="020B0606030504020204" pitchFamily="34" charset="0"/>
+                <a:ea typeface="Open Sans Light" panose="020B0606030504020204" pitchFamily="34" charset="0"/>
+                <a:cs typeface="Open Sans Light" panose="020B0606030504020204" pitchFamily="34" charset="0"/>
               </a:defRPr>
             </a:lvl4pPr>
             <a:lvl5pPr>
               <a:defRPr sz="1800" b="0" i="0" baseline="0">
-                <a:latin typeface="Open Sans" panose="020B0606030504020204" pitchFamily="34" charset="0"/>
-                <a:ea typeface="Open Sans" panose="020B0606030504020204" pitchFamily="34" charset="0"/>
-                <a:cs typeface="Open Sans" panose="020B0606030504020204" pitchFamily="34" charset="0"/>
+                <a:latin typeface="Open Sans Light" panose="020B0606030504020204" pitchFamily="34" charset="0"/>
+                <a:ea typeface="Open Sans Light" panose="020B0606030504020204" pitchFamily="34" charset="0"/>
+                <a:cs typeface="Open Sans Light" panose="020B0606030504020204" pitchFamily="34" charset="0"/>
               </a:defRPr>
             </a:lvl5pPr>
           </a:lstStyle>
@@ -8587,14 +8587,14 @@
           </a:ln>
           <a:extLst>
             <a:ext uri="{909E8E84-426E-40dd-AFC4-6F175D3DCCD1}">
-              <a14:hiddenFill xmlns="" xmlns:a14="http://schemas.microsoft.com/office/drawing/2010/main">
+              <a14:hiddenFill xmlns:a14="http://schemas.microsoft.com/office/drawing/2010/main" xmlns="">
                 <a:solidFill>
                   <a:srgbClr val="FFFFFF"/>
                 </a:solidFill>
               </a14:hiddenFill>
             </a:ext>
             <a:ext uri="{91240B29-F687-4f45-9708-019B960494DF}">
-              <a14:hiddenLine xmlns="" xmlns:a14="http://schemas.microsoft.com/office/drawing/2010/main" w="9525">
+              <a14:hiddenLine xmlns:a14="http://schemas.microsoft.com/office/drawing/2010/main" xmlns="" w="9525">
                 <a:solidFill>
                   <a:srgbClr val="000000"/>
                 </a:solidFill>
@@ -8604,7 +8604,7 @@
               </a14:hiddenLine>
             </a:ext>
             <a:ext uri="{FAA26D3D-D897-4be2-8F04-BA451C77F1D7}">
-              <ma14:placeholderFlag xmlns="" xmlns:ma14="http://schemas.microsoft.com/office/mac/drawingml/2011/main" val="1"/>
+              <ma14:placeholderFlag xmlns:ma14="http://schemas.microsoft.com/office/mac/drawingml/2011/main" xmlns="" val="1"/>
             </a:ext>
           </a:extLst>
         </p:spPr>
@@ -8649,14 +8649,14 @@
           </a:ln>
           <a:extLst>
             <a:ext uri="{909E8E84-426E-40dd-AFC4-6F175D3DCCD1}">
-              <a14:hiddenFill xmlns="" xmlns:a14="http://schemas.microsoft.com/office/drawing/2010/main">
+              <a14:hiddenFill xmlns:a14="http://schemas.microsoft.com/office/drawing/2010/main" xmlns="">
                 <a:solidFill>
                   <a:srgbClr val="FFFFFF"/>
                 </a:solidFill>
               </a14:hiddenFill>
             </a:ext>
             <a:ext uri="{91240B29-F687-4f45-9708-019B960494DF}">
-              <a14:hiddenLine xmlns="" xmlns:a14="http://schemas.microsoft.com/office/drawing/2010/main" w="9525">
+              <a14:hiddenLine xmlns:a14="http://schemas.microsoft.com/office/drawing/2010/main" xmlns="" w="9525">
                 <a:solidFill>
                   <a:srgbClr val="000000"/>
                 </a:solidFill>
@@ -8666,7 +8666,7 @@
               </a14:hiddenLine>
             </a:ext>
             <a:ext uri="{FAA26D3D-D897-4be2-8F04-BA451C77F1D7}">
-              <ma14:placeholderFlag xmlns="" xmlns:ma14="http://schemas.microsoft.com/office/mac/drawingml/2011/main" val="1"/>
+              <ma14:placeholderFlag xmlns:ma14="http://schemas.microsoft.com/office/mac/drawingml/2011/main" xmlns="" val="1"/>
             </a:ext>
           </a:extLst>
         </p:spPr>
@@ -8978,9 +8978,9 @@
           <a:solidFill>
             <a:schemeClr val="tx1"/>
           </a:solidFill>
-          <a:latin typeface="Open Sans" panose="020B0606030504020204" pitchFamily="34" charset="0"/>
-          <a:ea typeface="Open Sans" panose="020B0606030504020204" pitchFamily="34" charset="0"/>
-          <a:cs typeface="Open Sans" panose="020B0606030504020204" pitchFamily="34" charset="0"/>
+          <a:latin typeface="Open Sans Light" panose="020B0606030504020204" pitchFamily="34" charset="0"/>
+          <a:ea typeface="Open Sans Light" panose="020B0606030504020204" pitchFamily="34" charset="0"/>
+          <a:cs typeface="Open Sans Light" panose="020B0606030504020204" pitchFamily="34" charset="0"/>
         </a:defRPr>
       </a:lvl1pPr>
       <a:lvl2pPr marL="289315" indent="-96439" algn="l" rtl="0" eaLnBrk="1" fontAlgn="base" hangingPunct="1">
@@ -9000,9 +9000,9 @@
           <a:solidFill>
             <a:schemeClr val="tx1"/>
           </a:solidFill>
-          <a:latin typeface="Open Sans" panose="020B0606030504020204" pitchFamily="34" charset="0"/>
-          <a:ea typeface="Open Sans" panose="020B0606030504020204" pitchFamily="34" charset="0"/>
-          <a:cs typeface="Open Sans" panose="020B0606030504020204" pitchFamily="34" charset="0"/>
+          <a:latin typeface="Open Sans Light" panose="020B0606030504020204" pitchFamily="34" charset="0"/>
+          <a:ea typeface="Open Sans Light" panose="020B0606030504020204" pitchFamily="34" charset="0"/>
+          <a:cs typeface="Open Sans Light" panose="020B0606030504020204" pitchFamily="34" charset="0"/>
         </a:defRPr>
       </a:lvl2pPr>
       <a:lvl3pPr marL="482192" indent="-96439" algn="l" rtl="0" eaLnBrk="1" fontAlgn="base" hangingPunct="1">
@@ -9022,9 +9022,9 @@
           <a:solidFill>
             <a:schemeClr val="tx1"/>
           </a:solidFill>
-          <a:latin typeface="Open Sans" panose="020B0606030504020204" pitchFamily="34" charset="0"/>
-          <a:ea typeface="Open Sans" panose="020B0606030504020204" pitchFamily="34" charset="0"/>
-          <a:cs typeface="Open Sans" panose="020B0606030504020204" pitchFamily="34" charset="0"/>
+          <a:latin typeface="Open Sans Light" panose="020B0606030504020204" pitchFamily="34" charset="0"/>
+          <a:ea typeface="Open Sans Light" panose="020B0606030504020204" pitchFamily="34" charset="0"/>
+          <a:cs typeface="Open Sans Light" panose="020B0606030504020204" pitchFamily="34" charset="0"/>
         </a:defRPr>
       </a:lvl3pPr>
       <a:lvl4pPr marL="650958" indent="-72329" algn="l" rtl="0" eaLnBrk="1" fontAlgn="base" hangingPunct="1">
@@ -9044,9 +9044,9 @@
           <a:solidFill>
             <a:schemeClr val="tx1"/>
           </a:solidFill>
-          <a:latin typeface="Open Sans" panose="020B0606030504020204" pitchFamily="34" charset="0"/>
-          <a:ea typeface="Open Sans" panose="020B0606030504020204" pitchFamily="34" charset="0"/>
-          <a:cs typeface="Open Sans" panose="020B0606030504020204" pitchFamily="34" charset="0"/>
+          <a:latin typeface="Open Sans Light" panose="020B0606030504020204" pitchFamily="34" charset="0"/>
+          <a:ea typeface="Open Sans Light" panose="020B0606030504020204" pitchFamily="34" charset="0"/>
+          <a:cs typeface="Open Sans Light" panose="020B0606030504020204" pitchFamily="34" charset="0"/>
         </a:defRPr>
       </a:lvl4pPr>
       <a:lvl5pPr marL="843835" indent="-72329" algn="l" rtl="0" eaLnBrk="1" fontAlgn="base" hangingPunct="1">
@@ -9066,9 +9066,9 @@
           <a:solidFill>
             <a:schemeClr val="tx1"/>
           </a:solidFill>
-          <a:latin typeface="Open Sans" panose="020B0606030504020204" pitchFamily="34" charset="0"/>
-          <a:ea typeface="Open Sans" panose="020B0606030504020204" pitchFamily="34" charset="0"/>
-          <a:cs typeface="Open Sans" panose="020B0606030504020204" pitchFamily="34" charset="0"/>
+          <a:latin typeface="Open Sans Light" panose="020B0606030504020204" pitchFamily="34" charset="0"/>
+          <a:ea typeface="Open Sans Light" panose="020B0606030504020204" pitchFamily="34" charset="0"/>
+          <a:cs typeface="Open Sans Light" panose="020B0606030504020204" pitchFamily="34" charset="0"/>
         </a:defRPr>
       </a:lvl5pPr>
       <a:lvl6pPr marL="1036711" indent="-72329" algn="l" rtl="0" eaLnBrk="1" fontAlgn="base" hangingPunct="1">
@@ -9993,9 +9993,9 @@
           <a:p>
             <a:r>
               <a:rPr lang="en-US" sz="2400" dirty="0">
-                <a:latin typeface="Open Sans" panose="020B0606030504020204" pitchFamily="34" charset="0"/>
-                <a:ea typeface="Open Sans" panose="020B0606030504020204" pitchFamily="34" charset="0"/>
-                <a:cs typeface="Open Sans" panose="020B0606030504020204" pitchFamily="34" charset="0"/>
+                <a:latin typeface="Open Sans Light" panose="020B0606030504020204" pitchFamily="34" charset="0"/>
+                <a:ea typeface="Open Sans Light" panose="020B0606030504020204" pitchFamily="34" charset="0"/>
+                <a:cs typeface="Open Sans Light" panose="020B0606030504020204" pitchFamily="34" charset="0"/>
               </a:rPr>
               <a:t>Python organizes code in modules</a:t>
             </a:r>
@@ -10004,9 +10004,9 @@
             <a:pPr lvl="1"/>
             <a:r>
               <a:rPr lang="en-US" dirty="0">
-                <a:latin typeface="Open Sans" panose="020B0606030504020204" pitchFamily="34" charset="0"/>
-                <a:ea typeface="Open Sans" panose="020B0606030504020204" pitchFamily="34" charset="0"/>
-                <a:cs typeface="Open Sans" panose="020B0606030504020204" pitchFamily="34" charset="0"/>
+                <a:latin typeface="Open Sans Light" panose="020B0606030504020204" pitchFamily="34" charset="0"/>
+                <a:ea typeface="Open Sans Light" panose="020B0606030504020204" pitchFamily="34" charset="0"/>
+                <a:cs typeface="Open Sans Light" panose="020B0606030504020204" pitchFamily="34" charset="0"/>
               </a:rPr>
               <a:t>These functions come with Python, but you need to "import" them.</a:t>
             </a:r>
@@ -10039,9 +10039,9 @@
             </a:r>
             <a:r>
               <a:rPr lang="en-US" dirty="0">
-                <a:latin typeface="Open Sans" panose="020B0606030504020204" pitchFamily="34" charset="0"/>
-                <a:ea typeface="Open Sans" panose="020B0606030504020204" pitchFamily="34" charset="0"/>
-                <a:cs typeface="Open Sans" panose="020B0606030504020204" pitchFamily="34" charset="0"/>
+                <a:latin typeface="Open Sans Light" panose="020B0606030504020204" pitchFamily="34" charset="0"/>
+                <a:ea typeface="Open Sans Light" panose="020B0606030504020204" pitchFamily="34" charset="0"/>
+                <a:cs typeface="Open Sans Light" panose="020B0606030504020204" pitchFamily="34" charset="0"/>
               </a:rPr>
               <a:t>gives us access to</a:t>
             </a:r>
@@ -10065,9 +10065,9 @@
             </a:r>
             <a:r>
               <a:rPr lang="en-US" dirty="0">
-                <a:latin typeface="Open Sans" panose="020B0606030504020204" pitchFamily="34" charset="0"/>
-                <a:ea typeface="Open Sans" panose="020B0606030504020204" pitchFamily="34" charset="0"/>
-                <a:cs typeface="Open Sans" panose="020B0606030504020204" pitchFamily="34" charset="0"/>
+                <a:latin typeface="Open Sans Light" panose="020B0606030504020204" pitchFamily="34" charset="0"/>
+                <a:ea typeface="Open Sans Light" panose="020B0606030504020204" pitchFamily="34" charset="0"/>
+                <a:cs typeface="Open Sans Light" panose="020B0606030504020204" pitchFamily="34" charset="0"/>
               </a:rPr>
               <a:t>and </a:t>
             </a:r>
@@ -10120,9 +10120,9 @@
             </a:r>
             <a:r>
               <a:rPr lang="en-US" dirty="0">
-                <a:latin typeface="Open Sans" panose="020B0606030504020204" pitchFamily="34" charset="0"/>
-                <a:ea typeface="Open Sans" panose="020B0606030504020204" pitchFamily="34" charset="0"/>
-                <a:cs typeface="Open Sans" panose="020B0606030504020204" pitchFamily="34" charset="0"/>
+                <a:latin typeface="Open Sans Light" panose="020B0606030504020204" pitchFamily="34" charset="0"/>
+                <a:ea typeface="Open Sans Light" panose="020B0606030504020204" pitchFamily="34" charset="0"/>
+                <a:cs typeface="Open Sans Light" panose="020B0606030504020204" pitchFamily="34" charset="0"/>
               </a:rPr>
               <a:t>can access </a:t>
             </a:r>
@@ -10152,9 +10152,9 @@
             </a:r>
             <a:r>
               <a:rPr lang="en-US" dirty="0">
-                <a:latin typeface="Open Sans" panose="020B0606030504020204" pitchFamily="34" charset="0"/>
-                <a:ea typeface="Open Sans" panose="020B0606030504020204" pitchFamily="34" charset="0"/>
-                <a:cs typeface="Open Sans" panose="020B0606030504020204" pitchFamily="34" charset="0"/>
+                <a:latin typeface="Open Sans Light" panose="020B0606030504020204" pitchFamily="34" charset="0"/>
+                <a:ea typeface="Open Sans Light" panose="020B0606030504020204" pitchFamily="34" charset="0"/>
+                <a:cs typeface="Open Sans Light" panose="020B0606030504020204" pitchFamily="34" charset="0"/>
               </a:rPr>
               <a:t>(same code, just a different name)</a:t>
             </a:r>
@@ -10189,9 +10189,9 @@
             </a:r>
             <a:r>
               <a:rPr lang="en-US" dirty="0">
-                <a:latin typeface="Open Sans" panose="020B0606030504020204" pitchFamily="34" charset="0"/>
-                <a:ea typeface="Open Sans" panose="020B0606030504020204" pitchFamily="34" charset="0"/>
-                <a:cs typeface="Open Sans" panose="020B0606030504020204" pitchFamily="34" charset="0"/>
+                <a:latin typeface="Open Sans Light" panose="020B0606030504020204" pitchFamily="34" charset="0"/>
+                <a:ea typeface="Open Sans Light" panose="020B0606030504020204" pitchFamily="34" charset="0"/>
+                <a:cs typeface="Open Sans Light" panose="020B0606030504020204" pitchFamily="34" charset="0"/>
               </a:rPr>
               <a:t>can only access the functions we import. </a:t>
             </a:r>
@@ -10203,9 +10203,9 @@
             </a:r>
             <a:r>
               <a:rPr lang="en-US" dirty="0">
-                <a:latin typeface="Open Sans" panose="020B0606030504020204" pitchFamily="34" charset="0"/>
-                <a:ea typeface="Open Sans" panose="020B0606030504020204" pitchFamily="34" charset="0"/>
-                <a:cs typeface="Open Sans" panose="020B0606030504020204" pitchFamily="34" charset="0"/>
+                <a:latin typeface="Open Sans Light" panose="020B0606030504020204" pitchFamily="34" charset="0"/>
+                <a:ea typeface="Open Sans Light" panose="020B0606030504020204" pitchFamily="34" charset="0"/>
+                <a:cs typeface="Open Sans Light" panose="020B0606030504020204" pitchFamily="34" charset="0"/>
               </a:rPr>
               <a:t>is</a:t>
             </a:r>

</xml_diff>